<commit_message>
설계도 및 ServerThread()를 AcceptClient()함수로 수정
</commit_message>
<xml_diff>
--- a/설계도.pptx
+++ b/설계도.pptx
@@ -289,7 +289,7 @@
           <a:p>
             <a:fld id="{4AFF1424-E2AE-4606-9CF1-EF86A716C338}" type="datetimeFigureOut">
               <a:rPr lang="ko-KR" altLang="en-US" smtClean="0"/>
-              <a:t>2018-10-25</a:t>
+              <a:t>2018-11-01</a:t>
             </a:fld>
             <a:endParaRPr lang="ko-KR" altLang="en-US"/>
           </a:p>
@@ -459,7 +459,7 @@
           <a:p>
             <a:fld id="{4AFF1424-E2AE-4606-9CF1-EF86A716C338}" type="datetimeFigureOut">
               <a:rPr lang="ko-KR" altLang="en-US" smtClean="0"/>
-              <a:t>2018-10-25</a:t>
+              <a:t>2018-11-01</a:t>
             </a:fld>
             <a:endParaRPr lang="ko-KR" altLang="en-US"/>
           </a:p>
@@ -639,7 +639,7 @@
           <a:p>
             <a:fld id="{4AFF1424-E2AE-4606-9CF1-EF86A716C338}" type="datetimeFigureOut">
               <a:rPr lang="ko-KR" altLang="en-US" smtClean="0"/>
-              <a:t>2018-10-25</a:t>
+              <a:t>2018-11-01</a:t>
             </a:fld>
             <a:endParaRPr lang="ko-KR" altLang="en-US"/>
           </a:p>
@@ -809,7 +809,7 @@
           <a:p>
             <a:fld id="{4AFF1424-E2AE-4606-9CF1-EF86A716C338}" type="datetimeFigureOut">
               <a:rPr lang="ko-KR" altLang="en-US" smtClean="0"/>
-              <a:t>2018-10-25</a:t>
+              <a:t>2018-11-01</a:t>
             </a:fld>
             <a:endParaRPr lang="ko-KR" altLang="en-US"/>
           </a:p>
@@ -1055,7 +1055,7 @@
           <a:p>
             <a:fld id="{4AFF1424-E2AE-4606-9CF1-EF86A716C338}" type="datetimeFigureOut">
               <a:rPr lang="ko-KR" altLang="en-US" smtClean="0"/>
-              <a:t>2018-10-25</a:t>
+              <a:t>2018-11-01</a:t>
             </a:fld>
             <a:endParaRPr lang="ko-KR" altLang="en-US"/>
           </a:p>
@@ -1343,7 +1343,7 @@
           <a:p>
             <a:fld id="{4AFF1424-E2AE-4606-9CF1-EF86A716C338}" type="datetimeFigureOut">
               <a:rPr lang="ko-KR" altLang="en-US" smtClean="0"/>
-              <a:t>2018-10-25</a:t>
+              <a:t>2018-11-01</a:t>
             </a:fld>
             <a:endParaRPr lang="ko-KR" altLang="en-US"/>
           </a:p>
@@ -1765,7 +1765,7 @@
           <a:p>
             <a:fld id="{4AFF1424-E2AE-4606-9CF1-EF86A716C338}" type="datetimeFigureOut">
               <a:rPr lang="ko-KR" altLang="en-US" smtClean="0"/>
-              <a:t>2018-10-25</a:t>
+              <a:t>2018-11-01</a:t>
             </a:fld>
             <a:endParaRPr lang="ko-KR" altLang="en-US"/>
           </a:p>
@@ -1883,7 +1883,7 @@
           <a:p>
             <a:fld id="{4AFF1424-E2AE-4606-9CF1-EF86A716C338}" type="datetimeFigureOut">
               <a:rPr lang="ko-KR" altLang="en-US" smtClean="0"/>
-              <a:t>2018-10-25</a:t>
+              <a:t>2018-11-01</a:t>
             </a:fld>
             <a:endParaRPr lang="ko-KR" altLang="en-US"/>
           </a:p>
@@ -1978,7 +1978,7 @@
           <a:p>
             <a:fld id="{4AFF1424-E2AE-4606-9CF1-EF86A716C338}" type="datetimeFigureOut">
               <a:rPr lang="ko-KR" altLang="en-US" smtClean="0"/>
-              <a:t>2018-10-25</a:t>
+              <a:t>2018-11-01</a:t>
             </a:fld>
             <a:endParaRPr lang="ko-KR" altLang="en-US"/>
           </a:p>
@@ -2255,7 +2255,7 @@
           <a:p>
             <a:fld id="{4AFF1424-E2AE-4606-9CF1-EF86A716C338}" type="datetimeFigureOut">
               <a:rPr lang="ko-KR" altLang="en-US" smtClean="0"/>
-              <a:t>2018-10-25</a:t>
+              <a:t>2018-11-01</a:t>
             </a:fld>
             <a:endParaRPr lang="ko-KR" altLang="en-US"/>
           </a:p>
@@ -2508,7 +2508,7 @@
           <a:p>
             <a:fld id="{4AFF1424-E2AE-4606-9CF1-EF86A716C338}" type="datetimeFigureOut">
               <a:rPr lang="ko-KR" altLang="en-US" smtClean="0"/>
-              <a:t>2018-10-25</a:t>
+              <a:t>2018-11-01</a:t>
             </a:fld>
             <a:endParaRPr lang="ko-KR" altLang="en-US"/>
           </a:p>
@@ -2721,7 +2721,7 @@
           <a:p>
             <a:fld id="{4AFF1424-E2AE-4606-9CF1-EF86A716C338}" type="datetimeFigureOut">
               <a:rPr lang="ko-KR" altLang="en-US" smtClean="0"/>
-              <a:t>2018-10-25</a:t>
+              <a:t>2018-11-01</a:t>
             </a:fld>
             <a:endParaRPr lang="ko-KR" altLang="en-US"/>
           </a:p>
@@ -4176,11 +4176,7 @@
             <a:pPr algn="r"/>
             <a:r>
               <a:rPr lang="en-US" altLang="ko-KR" sz="1400" dirty="0" smtClean="0"/>
-              <a:t>CS_</a:t>
-            </a:r>
-            <a:r>
-              <a:rPr lang="en-US" altLang="ko-KR" sz="1400" dirty="0" smtClean="0"/>
-              <a:t>RUN ()</a:t>
+              <a:t>CS_RUN ()</a:t>
             </a:r>
             <a:endParaRPr lang="ko-KR" altLang="en-US" sz="1400" dirty="0"/>
           </a:p>
@@ -4241,13 +4237,8 @@
             <a:pPr algn="r"/>
             <a:r>
               <a:rPr lang="en-US" altLang="ko-KR" sz="1400" dirty="0" smtClean="0"/>
-              <a:t>SC_</a:t>
-            </a:r>
-            <a:r>
-              <a:rPr lang="en-US" altLang="ko-KR" sz="1400" dirty="0" smtClean="0"/>
-              <a:t>RUN ()</a:t>
-            </a:r>
-            <a:endParaRPr lang="en-US" altLang="ko-KR" sz="1400" dirty="0" smtClean="0"/>
+              <a:t>SC_RUN ()</a:t>
+            </a:r>
           </a:p>
           <a:p>
             <a:pPr algn="r"/>
@@ -4824,17 +4815,11 @@
             <a:avLst/>
           </a:prstGeom>
           <a:solidFill>
-            <a:schemeClr val="tx1">
-              <a:lumMod val="50000"/>
-              <a:lumOff val="50000"/>
-            </a:schemeClr>
+            <a:schemeClr val="tx1"/>
           </a:solidFill>
           <a:ln>
             <a:solidFill>
-              <a:schemeClr val="tx1">
-                <a:lumMod val="50000"/>
-                <a:lumOff val="50000"/>
-              </a:schemeClr>
+              <a:schemeClr val="tx1"/>
             </a:solidFill>
           </a:ln>
         </p:spPr>
@@ -4861,11 +4846,11 @@
             <a:pPr algn="ctr"/>
             <a:r>
               <a:rPr lang="en-US" altLang="ko-KR" dirty="0" err="1" smtClean="0"/>
-              <a:t>ServerThread</a:t>
+              <a:t>AcceptClient</a:t>
             </a:r>
             <a:r>
               <a:rPr lang="en-US" altLang="ko-KR" dirty="0" smtClean="0"/>
-              <a:t>()</a:t>
+              <a:t> ()</a:t>
             </a:r>
             <a:endParaRPr lang="ko-KR" altLang="en-US" dirty="0"/>
           </a:p>
@@ -4974,40 +4959,6 @@
       </p:cxnSp>
       <p:sp>
         <p:nvSpPr>
-          <p:cNvPr id="41" name="TextBox 40"/>
-          <p:cNvSpPr txBox="1"/>
-          <p:nvPr/>
-        </p:nvSpPr>
-        <p:spPr>
-          <a:xfrm>
-            <a:off x="3112822" y="529877"/>
-            <a:ext cx="1144865" cy="307777"/>
-          </a:xfrm>
-          <a:prstGeom prst="rect">
-            <a:avLst/>
-          </a:prstGeom>
-          <a:noFill/>
-        </p:spPr>
-        <p:txBody>
-          <a:bodyPr wrap="none" rtlCol="0">
-            <a:spAutoFit/>
-          </a:bodyPr>
-          <a:lstStyle/>
-          <a:p>
-            <a:r>
-              <a:rPr lang="ko-KR" altLang="en-US" sz="1400" dirty="0" err="1" smtClean="0"/>
-              <a:t>스레드</a:t>
-            </a:r>
-            <a:r>
-              <a:rPr lang="ko-KR" altLang="en-US" sz="1400" dirty="0" smtClean="0"/>
-              <a:t> 생성</a:t>
-            </a:r>
-            <a:endParaRPr lang="ko-KR" altLang="en-US" sz="1400" dirty="0"/>
-          </a:p>
-        </p:txBody>
-      </p:sp>
-      <p:sp>
-        <p:nvSpPr>
           <p:cNvPr id="47" name="TextBox 46"/>
           <p:cNvSpPr txBox="1"/>
           <p:nvPr/>
@@ -5161,11 +5112,7 @@
           <a:p>
             <a:r>
               <a:rPr lang="en-US" altLang="ko-KR" sz="1400" dirty="0" smtClean="0"/>
-              <a:t>SC_</a:t>
-            </a:r>
-            <a:r>
-              <a:rPr lang="en-US" altLang="ko-KR" sz="1400" dirty="0" smtClean="0"/>
-              <a:t>INIT ()</a:t>
+              <a:t>SC_INIT ()</a:t>
             </a:r>
             <a:endParaRPr lang="ko-KR" altLang="en-US" sz="1400" dirty="0"/>
           </a:p>
@@ -5196,23 +5143,14 @@
             <a:pPr algn="r"/>
             <a:r>
               <a:rPr lang="en-US" altLang="ko-KR" sz="1400" dirty="0" smtClean="0"/>
-              <a:t>SC_</a:t>
-            </a:r>
+              <a:t>SC_RUN ()</a:t>
+            </a:r>
+          </a:p>
+          <a:p>
+            <a:pPr algn="r"/>
             <a:r>
               <a:rPr lang="en-US" altLang="ko-KR" sz="1400" dirty="0" smtClean="0"/>
-              <a:t>RUN ()</a:t>
-            </a:r>
-            <a:endParaRPr lang="en-US" altLang="ko-KR" sz="1400" dirty="0" smtClean="0"/>
-          </a:p>
-          <a:p>
-            <a:pPr algn="r"/>
-            <a:r>
-              <a:rPr lang="en-US" altLang="ko-KR" sz="1400" dirty="0" smtClean="0"/>
-              <a:t>SC_</a:t>
-            </a:r>
-            <a:r>
-              <a:rPr lang="en-US" altLang="ko-KR" sz="1400" dirty="0" smtClean="0"/>
-              <a:t>SKILL ()</a:t>
+              <a:t>SC_SKILL ()</a:t>
             </a:r>
           </a:p>
           <a:p>
@@ -5250,11 +5188,7 @@
             <a:pPr algn="r"/>
             <a:r>
               <a:rPr lang="en-US" altLang="ko-KR" sz="1400" dirty="0" smtClean="0"/>
-              <a:t>CS_</a:t>
-            </a:r>
-            <a:r>
-              <a:rPr lang="en-US" altLang="ko-KR" sz="1400" dirty="0" smtClean="0"/>
-              <a:t>RUN ()</a:t>
+              <a:t>CS_RUN ()</a:t>
             </a:r>
             <a:endParaRPr lang="ko-KR" altLang="en-US" sz="1400" dirty="0"/>
           </a:p>

</xml_diff>